<commit_message>
Adding one reading and fixing typos
Adding the Banzhaf, Timmins, Ma (2019) reading. Updating lecture 11 and 12 to fix minor typos.
</commit_message>
<xml_diff>
--- a/lecture slides/lecture 11 - positive and normative.pptx
+++ b/lecture slides/lecture 11 - positive and normative.pptx
@@ -322,7 +322,7 @@
           <a:p>
             <a:fld id="{C6F51268-28D7-4A1D-B6E7-7FC724367079}" type="datetimeFigureOut">
               <a:rPr lang="en-US" smtClean="0"/>
-              <a:t>9/27/2023</a:t>
+              <a:t>10/3/2023</a:t>
             </a:fld>
             <a:endParaRPr lang="en-US"/>
           </a:p>
@@ -4791,7 +4791,7 @@
               <a:rPr lang="en-US" sz="2600" dirty="0">
                 <a:cs typeface="Calibri Light" panose="020F0302020204030204" pitchFamily="34" charset="0"/>
               </a:rPr>
-              <a:t>Econ 475</a:t>
+              <a:t>Econ 4075</a:t>
             </a:r>
           </a:p>
         </p:txBody>
@@ -4839,9 +4839,9 @@
           </a:lstStyle>
           <a:p>
             <a:r>
-              <a:rPr lang="en-US" sz="2700" dirty="0">
-                <a:solidFill>
-                  <a:schemeClr val="tx1"/>
+              <a:rPr lang="en-US" sz="2700" b="1" dirty="0">
+                <a:solidFill>
+                  <a:srgbClr val="0070C0"/>
                 </a:solidFill>
                 <a:latin typeface="+mn-lt"/>
                 <a:cs typeface="Calibri Light" panose="020F0302020204030204" pitchFamily="34" charset="0"/>

</xml_diff>